<commit_message>
Adding small DEF CON changes back into the main slide deck
</commit_message>
<xml_diff>
--- a/modules/mmap_chunks/mmap.pptx
+++ b/modules/mmap_chunks/mmap.pptx
@@ -16850,7 +16850,7 @@
           <a:p>
             <a:fld id="{2DA23E8D-1792-1541-9147-970A8DD8A355}" type="datetimeFigureOut">
               <a:rPr lang="en-US" smtClean="0"/>
-              <a:t>5/24/21</a:t>
+              <a:t>8/31/21</a:t>
             </a:fld>
             <a:endParaRPr lang="en-US" dirty="0"/>
           </a:p>
@@ -17572,7 +17572,7 @@
                 <a:latin typeface="Calibri"/>
               </a:rPr>
               <a:pPr/>
-              <a:t>5/24/21</a:t>
+              <a:t>8/31/21</a:t>
             </a:fld>
             <a:endParaRPr lang="en-US" dirty="0">
               <a:solidFill>
@@ -17825,7 +17825,7 @@
                 <a:latin typeface="Calibri"/>
               </a:rPr>
               <a:pPr/>
-              <a:t>5/24/21</a:t>
+              <a:t>8/31/21</a:t>
             </a:fld>
             <a:endParaRPr lang="en-US" dirty="0">
               <a:solidFill>
@@ -18040,7 +18040,7 @@
                 <a:latin typeface="Calibri"/>
               </a:rPr>
               <a:pPr/>
-              <a:t>5/24/21</a:t>
+              <a:t>8/31/21</a:t>
             </a:fld>
             <a:endParaRPr lang="en-US" dirty="0">
               <a:solidFill>
@@ -18324,7 +18324,7 @@
                 <a:latin typeface="Calibri"/>
               </a:rPr>
               <a:pPr/>
-              <a:t>5/24/21</a:t>
+              <a:t>8/31/21</a:t>
             </a:fld>
             <a:endParaRPr lang="en-US" dirty="0">
               <a:solidFill>
@@ -18666,7 +18666,7 @@
                 <a:latin typeface="Calibri"/>
               </a:rPr>
               <a:pPr/>
-              <a:t>5/24/21</a:t>
+              <a:t>8/31/21</a:t>
             </a:fld>
             <a:endParaRPr lang="en-US" dirty="0">
               <a:solidFill>
@@ -18994,7 +18994,7 @@
                 <a:latin typeface="Calibri"/>
               </a:rPr>
               <a:pPr/>
-              <a:t>5/24/21</a:t>
+              <a:t>8/31/21</a:t>
             </a:fld>
             <a:endParaRPr lang="en-US" dirty="0">
               <a:solidFill>
@@ -19483,7 +19483,7 @@
                 <a:latin typeface="Calibri"/>
               </a:rPr>
               <a:pPr/>
-              <a:t>5/24/21</a:t>
+              <a:t>8/31/21</a:t>
             </a:fld>
             <a:endParaRPr lang="en-US" dirty="0">
               <a:solidFill>
@@ -19666,7 +19666,7 @@
                 <a:latin typeface="Calibri"/>
               </a:rPr>
               <a:pPr/>
-              <a:t>5/24/21</a:t>
+              <a:t>8/31/21</a:t>
             </a:fld>
             <a:endParaRPr lang="en-US" dirty="0">
               <a:solidFill>
@@ -19912,7 +19912,7 @@
                 <a:latin typeface="Calibri"/>
               </a:rPr>
               <a:pPr/>
-              <a:t>5/24/21</a:t>
+              <a:t>8/31/21</a:t>
             </a:fld>
             <a:endParaRPr lang="en-US" dirty="0">
               <a:solidFill>
@@ -20254,7 +20254,7 @@
                 <a:latin typeface="Calibri"/>
               </a:rPr>
               <a:pPr/>
-              <a:t>5/24/21</a:t>
+              <a:t>8/31/21</a:t>
             </a:fld>
             <a:endParaRPr lang="en-US" dirty="0">
               <a:solidFill>
@@ -20546,7 +20546,7 @@
                 <a:latin typeface="Calibri"/>
               </a:rPr>
               <a:pPr/>
-              <a:t>5/24/21</a:t>
+              <a:t>8/31/21</a:t>
             </a:fld>
             <a:endParaRPr lang="en-US" dirty="0">
               <a:solidFill>
@@ -20796,7 +20796,7 @@
                 <a:latin typeface="Calibri"/>
               </a:rPr>
               <a:pPr defTabSz="914400"/>
-              <a:t>5/24/21</a:t>
+              <a:t>8/31/21</a:t>
             </a:fld>
             <a:endParaRPr lang="en-US" dirty="0">
               <a:solidFill>
@@ -30470,15 +30470,6 @@
           <a:solidFill>
             <a:srgbClr val="FFFFFF"/>
           </a:solidFill>
-          <a:extLst>
-            <a:ext uri="{909E8E84-426E-40DD-AFC4-6F175D3DCCD1}">
-              <a14:hiddenFill xmlns:a14="http://schemas.microsoft.com/office/drawing/2010/main">
-                <a:solidFill>
-                  <a:srgbClr val="FFFFFF"/>
-                </a:solidFill>
-              </a14:hiddenFill>
-            </a:ext>
-          </a:extLst>
         </p:spPr>
       </p:pic>
     </p:spTree>
@@ -31126,15 +31117,6 @@
           <a:solidFill>
             <a:srgbClr val="FFFFFF"/>
           </a:solidFill>
-          <a:extLst>
-            <a:ext uri="{909E8E84-426E-40DD-AFC4-6F175D3DCCD1}">
-              <a14:hiddenFill xmlns:a14="http://schemas.microsoft.com/office/drawing/2010/main">
-                <a:solidFill>
-                  <a:srgbClr val="FFFFFF"/>
-                </a:solidFill>
-              </a14:hiddenFill>
-            </a:ext>
-          </a:extLst>
         </p:spPr>
       </p:pic>
     </p:spTree>
@@ -33192,15 +33174,6 @@
           <a:solidFill>
             <a:srgbClr val="FFFFFF"/>
           </a:solidFill>
-          <a:extLst>
-            <a:ext uri="{909E8E84-426E-40DD-AFC4-6F175D3DCCD1}">
-              <a14:hiddenFill xmlns:a14="http://schemas.microsoft.com/office/drawing/2010/main">
-                <a:solidFill>
-                  <a:srgbClr val="FFFFFF"/>
-                </a:solidFill>
-              </a14:hiddenFill>
-            </a:ext>
-          </a:extLst>
         </p:spPr>
       </p:pic>
     </p:spTree>
@@ -34408,6 +34381,13 @@
             <a:r>
               <a:rPr lang="en-US" dirty="0" err="1"/>
               <a:t>Muney</a:t>
+            </a:r>
+            <a:endParaRPr lang="en-US" dirty="0"/>
+          </a:p>
+          <a:p>
+            <a:r>
+              <a:rPr lang="en-US"/>
+              <a:t>TODO</a:t>
             </a:r>
             <a:endParaRPr lang="en-US" dirty="0"/>
           </a:p>

</xml_diff>